<commit_message>
21.12.20 - 1 (mac)
# DO
1, 부정입학 필터 쿼리 수정
2, ppt 최종 수정
</commit_message>
<xml_diff>
--- a/project/ppt/웹프레임워크_프로젝트_ppt_20185304_허주환.pptx
+++ b/project/ppt/웹프레임워크_프로젝트_ppt_20185304_허주환.pptx
@@ -115,6 +115,11 @@
       </a:defRPr>
     </a:lvl9pPr>
   </p:defaultTextStyle>
+  <p:extLst>
+    <p:ext uri="{EFAFB233-063F-42B5-8137-9DF3F51BA10A}">
+      <p15:sldGuideLst xmlns:p15="http://schemas.microsoft.com/office/powerpoint/2012/main"/>
+    </p:ext>
+  </p:extLst>
 </p:presentation>
 </file>
 
@@ -200,7 +205,7 @@
           <a:p>
             <a:fld id="{4D33C835-B940-45B9-A41F-0BC55A4E2F1C}" type="datetimeFigureOut">
               <a:rPr lang="ko-KR" altLang="en-US" smtClean="0"/>
-              <a:t>2021-12-19</a:t>
+              <a:t>2021. 12. 20.</a:t>
             </a:fld>
             <a:endParaRPr lang="ko-KR" altLang="en-US"/>
           </a:p>
@@ -698,7 +703,7 @@
           <a:p>
             <a:fld id="{1AFF3E0D-191E-438C-B3C5-E20DFBC714F1}" type="datetimeFigureOut">
               <a:rPr lang="ko-KR" altLang="en-US" smtClean="0"/>
-              <a:t>2021-12-19</a:t>
+              <a:t>2021. 12. 20.</a:t>
             </a:fld>
             <a:endParaRPr lang="ko-KR" altLang="en-US"/>
           </a:p>
@@ -896,7 +901,7 @@
           <a:p>
             <a:fld id="{1AFF3E0D-191E-438C-B3C5-E20DFBC714F1}" type="datetimeFigureOut">
               <a:rPr lang="ko-KR" altLang="en-US" smtClean="0"/>
-              <a:t>2021-12-19</a:t>
+              <a:t>2021. 12. 20.</a:t>
             </a:fld>
             <a:endParaRPr lang="ko-KR" altLang="en-US"/>
           </a:p>
@@ -1104,7 +1109,7 @@
           <a:p>
             <a:fld id="{1AFF3E0D-191E-438C-B3C5-E20DFBC714F1}" type="datetimeFigureOut">
               <a:rPr lang="ko-KR" altLang="en-US" smtClean="0"/>
-              <a:t>2021-12-19</a:t>
+              <a:t>2021. 12. 20.</a:t>
             </a:fld>
             <a:endParaRPr lang="ko-KR" altLang="en-US"/>
           </a:p>
@@ -1302,7 +1307,7 @@
           <a:p>
             <a:fld id="{1AFF3E0D-191E-438C-B3C5-E20DFBC714F1}" type="datetimeFigureOut">
               <a:rPr lang="ko-KR" altLang="en-US" smtClean="0"/>
-              <a:t>2021-12-19</a:t>
+              <a:t>2021. 12. 20.</a:t>
             </a:fld>
             <a:endParaRPr lang="ko-KR" altLang="en-US"/>
           </a:p>
@@ -1577,7 +1582,7 @@
           <a:p>
             <a:fld id="{1AFF3E0D-191E-438C-B3C5-E20DFBC714F1}" type="datetimeFigureOut">
               <a:rPr lang="ko-KR" altLang="en-US" smtClean="0"/>
-              <a:t>2021-12-19</a:t>
+              <a:t>2021. 12. 20.</a:t>
             </a:fld>
             <a:endParaRPr lang="ko-KR" altLang="en-US"/>
           </a:p>
@@ -1842,7 +1847,7 @@
           <a:p>
             <a:fld id="{1AFF3E0D-191E-438C-B3C5-E20DFBC714F1}" type="datetimeFigureOut">
               <a:rPr lang="ko-KR" altLang="en-US" smtClean="0"/>
-              <a:t>2021-12-19</a:t>
+              <a:t>2021. 12. 20.</a:t>
             </a:fld>
             <a:endParaRPr lang="ko-KR" altLang="en-US"/>
           </a:p>
@@ -2254,7 +2259,7 @@
           <a:p>
             <a:fld id="{1AFF3E0D-191E-438C-B3C5-E20DFBC714F1}" type="datetimeFigureOut">
               <a:rPr lang="ko-KR" altLang="en-US" smtClean="0"/>
-              <a:t>2021-12-19</a:t>
+              <a:t>2021. 12. 20.</a:t>
             </a:fld>
             <a:endParaRPr lang="ko-KR" altLang="en-US"/>
           </a:p>
@@ -2395,7 +2400,7 @@
           <a:p>
             <a:fld id="{1AFF3E0D-191E-438C-B3C5-E20DFBC714F1}" type="datetimeFigureOut">
               <a:rPr lang="ko-KR" altLang="en-US" smtClean="0"/>
-              <a:t>2021-12-19</a:t>
+              <a:t>2021. 12. 20.</a:t>
             </a:fld>
             <a:endParaRPr lang="ko-KR" altLang="en-US"/>
           </a:p>
@@ -2508,7 +2513,7 @@
           <a:p>
             <a:fld id="{1AFF3E0D-191E-438C-B3C5-E20DFBC714F1}" type="datetimeFigureOut">
               <a:rPr lang="ko-KR" altLang="en-US" smtClean="0"/>
-              <a:t>2021-12-19</a:t>
+              <a:t>2021. 12. 20.</a:t>
             </a:fld>
             <a:endParaRPr lang="ko-KR" altLang="en-US"/>
           </a:p>
@@ -2819,7 +2824,7 @@
           <a:p>
             <a:fld id="{1AFF3E0D-191E-438C-B3C5-E20DFBC714F1}" type="datetimeFigureOut">
               <a:rPr lang="ko-KR" altLang="en-US" smtClean="0"/>
-              <a:t>2021-12-19</a:t>
+              <a:t>2021. 12. 20.</a:t>
             </a:fld>
             <a:endParaRPr lang="ko-KR" altLang="en-US"/>
           </a:p>
@@ -3107,7 +3112,7 @@
           <a:p>
             <a:fld id="{1AFF3E0D-191E-438C-B3C5-E20DFBC714F1}" type="datetimeFigureOut">
               <a:rPr lang="ko-KR" altLang="en-US" smtClean="0"/>
-              <a:t>2021-12-19</a:t>
+              <a:t>2021. 12. 20.</a:t>
             </a:fld>
             <a:endParaRPr lang="ko-KR" altLang="en-US"/>
           </a:p>
@@ -3348,7 +3353,7 @@
           <a:p>
             <a:fld id="{1AFF3E0D-191E-438C-B3C5-E20DFBC714F1}" type="datetimeFigureOut">
               <a:rPr lang="ko-KR" altLang="en-US" smtClean="0"/>
-              <a:t>2021-12-19</a:t>
+              <a:t>2021. 12. 20.</a:t>
             </a:fld>
             <a:endParaRPr lang="ko-KR" altLang="en-US"/>
           </a:p>
@@ -3937,9 +3942,16 @@
             <p:ph idx="1"/>
           </p:nvPr>
         </p:nvSpPr>
-        <p:spPr/>
-        <p:txBody>
-          <a:bodyPr/>
+        <p:spPr>
+          <a:xfrm>
+            <a:off x="838200" y="1825624"/>
+            <a:ext cx="10515600" cy="4827423"/>
+          </a:xfrm>
+        </p:spPr>
+        <p:txBody>
+          <a:bodyPr>
+            <a:normAutofit/>
+          </a:bodyPr>
           <a:lstStyle/>
           <a:p>
             <a:r>
@@ -3998,14 +4010,81 @@
             </a:r>
             <a:r>
               <a:rPr lang="ko-KR" altLang="en-US" dirty="0"/>
-              <a:t>수능 최저점수와 비교</a:t>
-            </a:r>
+              <a:t>수능 최저 점수와 비교하고 입학 여부가</a:t>
+            </a:r>
+            <a:r>
+              <a:rPr lang="en-US" altLang="ko-KR" dirty="0"/>
+              <a:t> Y</a:t>
+            </a:r>
+            <a:r>
+              <a:rPr lang="ko-KR" altLang="en-US" dirty="0"/>
+              <a:t>일 경우 </a:t>
+            </a:r>
+            <a:r>
+              <a:rPr lang="en-US" altLang="ko-KR" dirty="0"/>
+              <a:t>=</a:t>
+            </a:r>
+            <a:r>
+              <a:rPr lang="ko-KR" altLang="en-US" dirty="0"/>
+              <a:t> </a:t>
+            </a:r>
+            <a:r>
+              <a:rPr lang="ko-KR" altLang="en-US" b="1" dirty="0"/>
+              <a:t>부정 의심</a:t>
+            </a:r>
+            <a:endParaRPr lang="en-US" altLang="ko-KR" b="1" dirty="0"/>
+          </a:p>
+          <a:p>
             <a:endParaRPr lang="en-US" altLang="ko-KR" dirty="0"/>
           </a:p>
           <a:p>
+            <a:r>
+              <a:rPr lang="ko-KR" altLang="en-US" dirty="0"/>
+              <a:t> </a:t>
+            </a:r>
+            <a:r>
+              <a:rPr lang="en-US" altLang="ko-KR" dirty="0"/>
+              <a:t>( </a:t>
+            </a:r>
+            <a:r>
+              <a:rPr lang="ko-KR" altLang="en-US" dirty="0"/>
+              <a:t>학생</a:t>
+            </a:r>
+            <a:r>
+              <a:rPr lang="en-US" altLang="ko-KR" dirty="0"/>
+              <a:t>.</a:t>
+            </a:r>
+            <a:r>
+              <a:rPr lang="ko-KR" altLang="en-US" dirty="0"/>
+              <a:t>수시점수 </a:t>
+            </a:r>
+            <a:r>
+              <a:rPr lang="en-US" altLang="ko-KR" dirty="0"/>
+              <a:t>&lt; </a:t>
+            </a:r>
+            <a:r>
+              <a:rPr lang="ko-KR" altLang="en-US" dirty="0"/>
+              <a:t>대학입시정보</a:t>
+            </a:r>
+            <a:r>
+              <a:rPr lang="en-US" altLang="ko-KR" dirty="0"/>
+              <a:t>.</a:t>
+            </a:r>
+            <a:r>
+              <a:rPr lang="ko-KR" altLang="en-US" dirty="0"/>
+              <a:t>최소수시점수 </a:t>
+            </a:r>
             <a:endParaRPr lang="en-US" altLang="ko-KR" dirty="0"/>
           </a:p>
           <a:p>
+            <a:r>
+              <a:rPr lang="en-US" altLang="ko-KR" dirty="0"/>
+              <a:t> </a:t>
+            </a:r>
+            <a:r>
+              <a:rPr lang="en-US" altLang="ko-KR" b="1" dirty="0"/>
+              <a:t>OR</a:t>
+            </a:r>
             <a:r>
               <a:rPr lang="ko-KR" altLang="en-US" dirty="0"/>
               <a:t> 학생</a:t>
@@ -4016,11 +4095,11 @@
             </a:r>
             <a:r>
               <a:rPr lang="ko-KR" altLang="en-US" dirty="0"/>
-              <a:t>수시점수 </a:t>
+              <a:t>수능점수 </a:t>
             </a:r>
             <a:r>
               <a:rPr lang="en-US" altLang="ko-KR" dirty="0"/>
-              <a:t>&lt; </a:t>
+              <a:t>&gt; </a:t>
             </a:r>
             <a:r>
               <a:rPr lang="ko-KR" altLang="en-US" dirty="0"/>
@@ -4032,9 +4111,12 @@
             </a:r>
             <a:r>
               <a:rPr lang="ko-KR" altLang="en-US" dirty="0"/>
-              <a:t>최소수시점수 </a:t>
-            </a:r>
-            <a:endParaRPr lang="en-US" altLang="ko-KR" dirty="0"/>
+              <a:t>최소수능점수</a:t>
+            </a:r>
+            <a:r>
+              <a:rPr lang="en-US" altLang="ko-KR" dirty="0"/>
+              <a:t> )</a:t>
+            </a:r>
           </a:p>
           <a:p>
             <a:r>
@@ -4043,37 +4125,40 @@
             </a:r>
             <a:r>
               <a:rPr lang="en-US" altLang="ko-KR" b="1" dirty="0"/>
-              <a:t>OR</a:t>
+              <a:t>AND</a:t>
+            </a:r>
+            <a:r>
+              <a:rPr lang="en-US" altLang="ko-KR" dirty="0"/>
+              <a:t> </a:t>
             </a:r>
             <a:r>
               <a:rPr lang="ko-KR" altLang="en-US" dirty="0"/>
-              <a:t> 학생</a:t>
+              <a:t>학생</a:t>
             </a:r>
             <a:r>
               <a:rPr lang="en-US" altLang="ko-KR" dirty="0"/>
               <a:t>.</a:t>
             </a:r>
             <a:r>
+              <a:rPr lang="ko-KR" altLang="en-US" dirty="0" err="1"/>
+              <a:t>입학여부</a:t>
+            </a:r>
+            <a:r>
               <a:rPr lang="ko-KR" altLang="en-US" dirty="0"/>
-              <a:t>수능점수 </a:t>
+              <a:t> </a:t>
             </a:r>
             <a:r>
               <a:rPr lang="en-US" altLang="ko-KR" dirty="0"/>
-              <a:t>&gt; </a:t>
+              <a:t>=</a:t>
             </a:r>
             <a:r>
               <a:rPr lang="ko-KR" altLang="en-US" dirty="0"/>
-              <a:t>대학입시정보</a:t>
+              <a:t> </a:t>
             </a:r>
             <a:r>
               <a:rPr lang="en-US" altLang="ko-KR" dirty="0"/>
-              <a:t>.</a:t>
-            </a:r>
-            <a:r>
-              <a:rPr lang="ko-KR" altLang="en-US" dirty="0"/>
-              <a:t>최소수능점수</a:t>
-            </a:r>
-            <a:endParaRPr lang="en-US" altLang="ko-KR" dirty="0"/>
+              <a:t>‘Y’</a:t>
+            </a:r>
           </a:p>
         </p:txBody>
       </p:sp>
@@ -4125,7 +4210,7 @@
         </p:nvSpPr>
         <p:spPr>
           <a:xfrm>
-            <a:off x="0" y="18255"/>
+            <a:off x="0" y="220268"/>
             <a:ext cx="10515600" cy="1325563"/>
           </a:xfrm>
         </p:spPr>
@@ -4337,96 +4422,112 @@
           </a:extLst>
         </p:spPr>
       </p:pic>
-      <p:pic>
-        <p:nvPicPr>
-          <p:cNvPr id="7" name="그림 6">
-            <a:extLst>
-              <a:ext uri="{FF2B5EF4-FFF2-40B4-BE49-F238E27FC236}">
-                <a16:creationId xmlns:a16="http://schemas.microsoft.com/office/drawing/2014/main" id="{3F9FFB12-6F0E-42EA-9F88-3A38DF84CB10}"/>
-              </a:ext>
-            </a:extLst>
-          </p:cNvPr>
-          <p:cNvPicPr>
-            <a:picLocks noChangeAspect="1"/>
-          </p:cNvPicPr>
+      <p:grpSp>
+        <p:nvGrpSpPr>
+          <p:cNvPr id="5" name="그룹 4">
+            <a:extLst>
+              <a:ext uri="{FF2B5EF4-FFF2-40B4-BE49-F238E27FC236}">
+                <a16:creationId xmlns:a16="http://schemas.microsoft.com/office/drawing/2014/main" id="{F37B8563-6C30-5744-82FF-99A93D69D0C8}"/>
+              </a:ext>
+            </a:extLst>
+          </p:cNvPr>
+          <p:cNvGrpSpPr/>
           <p:nvPr/>
-        </p:nvPicPr>
-        <p:blipFill>
-          <a:blip r:embed="rId6"/>
-          <a:stretch>
-            <a:fillRect/>
-          </a:stretch>
-        </p:blipFill>
-        <p:spPr>
+        </p:nvGrpSpPr>
+        <p:grpSpPr>
           <a:xfrm>
-            <a:off x="6319535" y="1669214"/>
-            <a:ext cx="5422300" cy="4854520"/>
-          </a:xfrm>
-          <a:prstGeom prst="rect">
-            <a:avLst/>
-          </a:prstGeom>
-          <a:ln w="28575">
-            <a:solidFill>
+            <a:off x="6389129" y="1916289"/>
+            <a:ext cx="5428581" cy="4662684"/>
+            <a:chOff x="6912106" y="1756045"/>
+            <a:chExt cx="5006922" cy="4351339"/>
+          </a:xfrm>
+        </p:grpSpPr>
+        <p:pic>
+          <p:nvPicPr>
+            <p:cNvPr id="4" name="그림 3">
+              <a:extLst>
+                <a:ext uri="{FF2B5EF4-FFF2-40B4-BE49-F238E27FC236}">
+                  <a16:creationId xmlns:a16="http://schemas.microsoft.com/office/drawing/2014/main" id="{92267565-D315-2145-82B7-FA6B276CA09C}"/>
+                </a:ext>
+              </a:extLst>
+            </p:cNvPr>
+            <p:cNvPicPr>
+              <a:picLocks noChangeAspect="1"/>
+            </p:cNvPicPr>
+            <p:nvPr/>
+          </p:nvPicPr>
+          <p:blipFill>
+            <a:blip r:embed="rId6"/>
+            <a:stretch>
+              <a:fillRect/>
+            </a:stretch>
+          </p:blipFill>
+          <p:spPr>
+            <a:xfrm>
+              <a:off x="6912106" y="1756045"/>
+              <a:ext cx="5006922" cy="4351339"/>
+            </a:xfrm>
+            <a:prstGeom prst="rect">
+              <a:avLst/>
+            </a:prstGeom>
+          </p:spPr>
+        </p:pic>
+        <p:sp>
+          <p:nvSpPr>
+            <p:cNvPr id="8" name="직사각형 7">
+              <a:extLst>
+                <a:ext uri="{FF2B5EF4-FFF2-40B4-BE49-F238E27FC236}">
+                  <a16:creationId xmlns:a16="http://schemas.microsoft.com/office/drawing/2014/main" id="{ADAEAD64-A261-4719-85DA-422C8AAC3DDF}"/>
+                </a:ext>
+              </a:extLst>
+            </p:cNvPr>
+            <p:cNvSpPr/>
+            <p:nvPr/>
+          </p:nvSpPr>
+          <p:spPr>
+            <a:xfrm>
+              <a:off x="7280489" y="4663621"/>
+              <a:ext cx="2935565" cy="1169619"/>
+            </a:xfrm>
+            <a:prstGeom prst="rect">
+              <a:avLst/>
+            </a:prstGeom>
+            <a:noFill/>
+            <a:ln w="38100">
+              <a:solidFill>
+                <a:schemeClr val="accent4">
+                  <a:lumMod val="40000"/>
+                  <a:lumOff val="60000"/>
+                </a:schemeClr>
+              </a:solidFill>
+            </a:ln>
+          </p:spPr>
+          <p:style>
+            <a:lnRef idx="2">
+              <a:schemeClr val="accent1">
+                <a:shade val="50000"/>
+              </a:schemeClr>
+            </a:lnRef>
+            <a:fillRef idx="1">
               <a:schemeClr val="accent1"/>
-            </a:solidFill>
-          </a:ln>
-        </p:spPr>
-      </p:pic>
-      <p:sp>
-        <p:nvSpPr>
-          <p:cNvPr id="8" name="직사각형 7">
-            <a:extLst>
-              <a:ext uri="{FF2B5EF4-FFF2-40B4-BE49-F238E27FC236}">
-                <a16:creationId xmlns:a16="http://schemas.microsoft.com/office/drawing/2014/main" id="{ADAEAD64-A261-4719-85DA-422C8AAC3DDF}"/>
-              </a:ext>
-            </a:extLst>
-          </p:cNvPr>
-          <p:cNvSpPr/>
-          <p:nvPr/>
-        </p:nvSpPr>
-        <p:spPr>
-          <a:xfrm>
-            <a:off x="7206917" y="5474368"/>
-            <a:ext cx="2382252" cy="546184"/>
-          </a:xfrm>
-          <a:prstGeom prst="rect">
-            <a:avLst/>
-          </a:prstGeom>
-          <a:noFill/>
-          <a:ln w="38100">
-            <a:solidFill>
-              <a:schemeClr val="accent4">
-                <a:lumMod val="40000"/>
-                <a:lumOff val="60000"/>
-              </a:schemeClr>
-            </a:solidFill>
-          </a:ln>
-        </p:spPr>
-        <p:style>
-          <a:lnRef idx="2">
-            <a:schemeClr val="accent1">
-              <a:shade val="50000"/>
-            </a:schemeClr>
-          </a:lnRef>
-          <a:fillRef idx="1">
-            <a:schemeClr val="accent1"/>
-          </a:fillRef>
-          <a:effectRef idx="0">
-            <a:schemeClr val="accent1"/>
-          </a:effectRef>
-          <a:fontRef idx="minor">
-            <a:schemeClr val="lt1"/>
-          </a:fontRef>
-        </p:style>
-        <p:txBody>
-          <a:bodyPr rtlCol="0" anchor="ctr"/>
-          <a:lstStyle/>
-          <a:p>
-            <a:pPr algn="ctr"/>
-            <a:endParaRPr lang="ko-KR" altLang="en-US"/>
-          </a:p>
-        </p:txBody>
-      </p:sp>
+            </a:fillRef>
+            <a:effectRef idx="0">
+              <a:schemeClr val="accent1"/>
+            </a:effectRef>
+            <a:fontRef idx="minor">
+              <a:schemeClr val="lt1"/>
+            </a:fontRef>
+          </p:style>
+          <p:txBody>
+            <a:bodyPr rtlCol="0" anchor="ctr"/>
+            <a:lstStyle/>
+            <a:p>
+              <a:pPr algn="ctr"/>
+              <a:endParaRPr lang="ko-KR" altLang="en-US"/>
+            </a:p>
+          </p:txBody>
+        </p:sp>
+      </p:grpSp>
     </p:spTree>
     <p:extLst>
       <p:ext uri="{BB962C8B-B14F-4D97-AF65-F5344CB8AC3E}">

</xml_diff>